<commit_message>
et and s3 io Spark/s3 io
</commit_message>
<xml_diff>
--- a/jbook/figures/deepctr_logo.pptx
+++ b/jbook/figures/deepctr_logo.pptx
@@ -5,14 +5,18 @@
     <p:sldMasterId id="2147483723" r:id="rId1"/>
   </p:sldMasterIdLst>
   <p:notesMasterIdLst>
-    <p:notesMasterId r:id="rId4"/>
+    <p:notesMasterId r:id="rId8"/>
   </p:notesMasterIdLst>
   <p:handoutMasterIdLst>
-    <p:handoutMasterId r:id="rId5"/>
+    <p:handoutMasterId r:id="rId9"/>
   </p:handoutMasterIdLst>
   <p:sldIdLst>
     <p:sldId id="287" r:id="rId2"/>
     <p:sldId id="288" r:id="rId3"/>
+    <p:sldId id="289" r:id="rId4"/>
+    <p:sldId id="290" r:id="rId5"/>
+    <p:sldId id="291" r:id="rId6"/>
+    <p:sldId id="292" r:id="rId7"/>
   </p:sldIdLst>
   <p:sldSz cx="21674138" cy="12192000"/>
   <p:notesSz cx="6858000" cy="9144000"/>
@@ -121,6 +125,10 @@
           <p14:sldIdLst>
             <p14:sldId id="287"/>
             <p14:sldId id="288"/>
+            <p14:sldId id="289"/>
+            <p14:sldId id="290"/>
+            <p14:sldId id="291"/>
+            <p14:sldId id="292"/>
           </p14:sldIdLst>
         </p14:section>
         <p14:section name="Learn More" id="{2CC34DB2-6590-42C0-AD4B-A04C6060184E}">
@@ -4288,23 +4296,8 @@
                 </a:solidFill>
                 <a:latin typeface="Lato" panose="020F0502020204030203" pitchFamily="34" charset="0"/>
               </a:rPr>
-              <a:t>Digital Advertising </a:t>
-            </a:r>
-            <a:r>
-              <a:rPr lang="en-US" sz="2000">
-                <a:solidFill>
-                  <a:srgbClr val="ECB365"/>
-                </a:solidFill>
-                <a:latin typeface="Lato" panose="020F0502020204030203" pitchFamily="34" charset="0"/>
-              </a:rPr>
-              <a:t>CTR Prediction</a:t>
-            </a:r>
-            <a:endParaRPr lang="en-US" sz="2000" dirty="0">
-              <a:solidFill>
-                <a:srgbClr val="ECB365"/>
-              </a:solidFill>
-              <a:latin typeface="Lato" panose="020F0502020204030203" pitchFamily="34" charset="0"/>
-            </a:endParaRPr>
+              <a:t>Digital Advertising CTR Prediction</a:t>
+            </a:r>
           </a:p>
         </p:txBody>
       </p:sp>
@@ -4402,6 +4395,686 @@
     <p:extLst>
       <p:ext uri="{BB962C8B-B14F-4D97-AF65-F5344CB8AC3E}">
         <p14:creationId xmlns:p14="http://schemas.microsoft.com/office/powerpoint/2010/main" val="1122227180"/>
+      </p:ext>
+    </p:extLst>
+  </p:cSld>
+  <p:clrMapOvr>
+    <a:masterClrMapping/>
+  </p:clrMapOvr>
+</p:sld>
+</file>
+
+<file path=ppt/slides/slide3.xml><?xml version="1.0" encoding="utf-8"?>
+<p:sld xmlns:a="http://schemas.openxmlformats.org/drawingml/2006/main" xmlns:r="http://schemas.openxmlformats.org/officeDocument/2006/relationships" xmlns:p="http://schemas.openxmlformats.org/presentationml/2006/main">
+  <p:cSld>
+    <p:spTree>
+      <p:nvGrpSpPr>
+        <p:cNvPr id="1" name=""/>
+        <p:cNvGrpSpPr/>
+        <p:nvPr/>
+      </p:nvGrpSpPr>
+      <p:grpSpPr>
+        <a:xfrm>
+          <a:off x="0" y="0"/>
+          <a:ext cx="0" cy="0"/>
+          <a:chOff x="0" y="0"/>
+          <a:chExt cx="0" cy="0"/>
+        </a:xfrm>
+      </p:grpSpPr>
+      <p:sp>
+        <p:nvSpPr>
+          <p:cNvPr id="6" name="Hexagon 5">
+            <a:extLst>
+              <a:ext uri="{FF2B5EF4-FFF2-40B4-BE49-F238E27FC236}">
+                <a16:creationId xmlns:a16="http://schemas.microsoft.com/office/drawing/2014/main" id="{F6CC9087-0B94-4AFD-A2DE-7A38436A24A2}"/>
+              </a:ext>
+            </a:extLst>
+          </p:cNvPr>
+          <p:cNvSpPr/>
+          <p:nvPr/>
+        </p:nvSpPr>
+        <p:spPr>
+          <a:xfrm>
+            <a:off x="4202402" y="745273"/>
+            <a:ext cx="14888817" cy="11052313"/>
+          </a:xfrm>
+          <a:prstGeom prst="hexagon">
+            <a:avLst/>
+          </a:prstGeom>
+          <a:solidFill>
+            <a:srgbClr val="041C32"/>
+          </a:solidFill>
+        </p:spPr>
+        <p:style>
+          <a:lnRef idx="2">
+            <a:schemeClr val="accent1">
+              <a:shade val="50000"/>
+            </a:schemeClr>
+          </a:lnRef>
+          <a:fillRef idx="1">
+            <a:schemeClr val="accent1"/>
+          </a:fillRef>
+          <a:effectRef idx="0">
+            <a:schemeClr val="accent1"/>
+          </a:effectRef>
+          <a:fontRef idx="minor">
+            <a:schemeClr val="lt1"/>
+          </a:fontRef>
+        </p:style>
+        <p:txBody>
+          <a:bodyPr rtlCol="0" anchor="ctr"/>
+          <a:lstStyle/>
+          <a:p>
+            <a:pPr algn="ctr"/>
+            <a:endParaRPr lang="en-US" dirty="0"/>
+          </a:p>
+        </p:txBody>
+      </p:sp>
+      <p:pic>
+        <p:nvPicPr>
+          <p:cNvPr id="4" name="Picture 3">
+            <a:extLst>
+              <a:ext uri="{FF2B5EF4-FFF2-40B4-BE49-F238E27FC236}">
+                <a16:creationId xmlns:a16="http://schemas.microsoft.com/office/drawing/2014/main" id="{B450F231-23AE-4F87-ADAF-27CDF1697F88}"/>
+              </a:ext>
+            </a:extLst>
+          </p:cNvPr>
+          <p:cNvPicPr>
+            <a:picLocks noChangeAspect="1"/>
+          </p:cNvPicPr>
+          <p:nvPr/>
+        </p:nvPicPr>
+        <p:blipFill>
+          <a:blip r:embed="rId2"/>
+          <a:stretch>
+            <a:fillRect/>
+          </a:stretch>
+        </p:blipFill>
+        <p:spPr>
+          <a:xfrm>
+            <a:off x="10776109" y="1302996"/>
+            <a:ext cx="6695627" cy="5806364"/>
+          </a:xfrm>
+          <a:prstGeom prst="rect">
+            <a:avLst/>
+          </a:prstGeom>
+        </p:spPr>
+      </p:pic>
+      <p:pic>
+        <p:nvPicPr>
+          <p:cNvPr id="5" name="Picture 4">
+            <a:extLst>
+              <a:ext uri="{FF2B5EF4-FFF2-40B4-BE49-F238E27FC236}">
+                <a16:creationId xmlns:a16="http://schemas.microsoft.com/office/drawing/2014/main" id="{42DC76B3-C1D3-40B9-AE22-2D6FA67C7E2F}"/>
+              </a:ext>
+            </a:extLst>
+          </p:cNvPr>
+          <p:cNvPicPr>
+            <a:picLocks noChangeAspect="1"/>
+          </p:cNvPicPr>
+          <p:nvPr/>
+        </p:nvPicPr>
+        <p:blipFill>
+          <a:blip r:embed="rId3"/>
+          <a:stretch>
+            <a:fillRect/>
+          </a:stretch>
+        </p:blipFill>
+        <p:spPr>
+          <a:xfrm>
+            <a:off x="6283196" y="2140927"/>
+            <a:ext cx="4130503" cy="4130503"/>
+          </a:xfrm>
+          <a:prstGeom prst="rect">
+            <a:avLst/>
+          </a:prstGeom>
+        </p:spPr>
+      </p:pic>
+      <p:sp>
+        <p:nvSpPr>
+          <p:cNvPr id="7" name="TextBox 6">
+            <a:extLst>
+              <a:ext uri="{FF2B5EF4-FFF2-40B4-BE49-F238E27FC236}">
+                <a16:creationId xmlns:a16="http://schemas.microsoft.com/office/drawing/2014/main" id="{86DBB56B-5BF3-4F21-B2BA-A5EB5D6391A5}"/>
+              </a:ext>
+            </a:extLst>
+          </p:cNvPr>
+          <p:cNvSpPr txBox="1"/>
+          <p:nvPr/>
+        </p:nvSpPr>
+        <p:spPr>
+          <a:xfrm flipH="1">
+            <a:off x="7010400" y="6916773"/>
+            <a:ext cx="9245599" cy="2554545"/>
+          </a:xfrm>
+          <a:prstGeom prst="rect">
+            <a:avLst/>
+          </a:prstGeom>
+          <a:noFill/>
+        </p:spPr>
+        <p:txBody>
+          <a:bodyPr wrap="square" rtlCol="0">
+            <a:spAutoFit/>
+          </a:bodyPr>
+          <a:lstStyle/>
+          <a:p>
+            <a:pPr algn="ctr"/>
+            <a:r>
+              <a:rPr lang="en-US" sz="9600" dirty="0" err="1">
+                <a:solidFill>
+                  <a:schemeClr val="bg1"/>
+                </a:solidFill>
+                <a:latin typeface="Lato" panose="020F0502020204030203" pitchFamily="34" charset="0"/>
+              </a:rPr>
+              <a:t>DeepNeuralCTR</a:t>
+            </a:r>
+            <a:endParaRPr lang="en-US" sz="9600" dirty="0">
+              <a:solidFill>
+                <a:schemeClr val="bg1"/>
+              </a:solidFill>
+              <a:latin typeface="Lato" panose="020F0502020204030203" pitchFamily="34" charset="0"/>
+            </a:endParaRPr>
+          </a:p>
+          <a:p>
+            <a:pPr algn="ctr"/>
+            <a:r>
+              <a:rPr lang="en-US" sz="3200" dirty="0">
+                <a:solidFill>
+                  <a:srgbClr val="ECB365"/>
+                </a:solidFill>
+                <a:latin typeface="Lato" panose="020F0502020204030203" pitchFamily="34" charset="0"/>
+              </a:rPr>
+              <a:t>Deep Learning and Neural Architecture Search in Digital Advertising CTR Prediction</a:t>
+            </a:r>
+            <a:endParaRPr lang="en-US" sz="500" dirty="0">
+              <a:solidFill>
+                <a:srgbClr val="ECB365"/>
+              </a:solidFill>
+              <a:latin typeface="Lato" panose="020F0502020204030203" pitchFamily="34" charset="0"/>
+            </a:endParaRPr>
+          </a:p>
+        </p:txBody>
+      </p:sp>
+    </p:spTree>
+    <p:extLst>
+      <p:ext uri="{BB962C8B-B14F-4D97-AF65-F5344CB8AC3E}">
+        <p14:creationId xmlns:p14="http://schemas.microsoft.com/office/powerpoint/2010/main" val="359823065"/>
+      </p:ext>
+    </p:extLst>
+  </p:cSld>
+  <p:clrMapOvr>
+    <a:masterClrMapping/>
+  </p:clrMapOvr>
+</p:sld>
+</file>
+
+<file path=ppt/slides/slide4.xml><?xml version="1.0" encoding="utf-8"?>
+<p:sld xmlns:a="http://schemas.openxmlformats.org/drawingml/2006/main" xmlns:r="http://schemas.openxmlformats.org/officeDocument/2006/relationships" xmlns:p="http://schemas.openxmlformats.org/presentationml/2006/main">
+  <p:cSld>
+    <p:spTree>
+      <p:nvGrpSpPr>
+        <p:cNvPr id="1" name=""/>
+        <p:cNvGrpSpPr/>
+        <p:nvPr/>
+      </p:nvGrpSpPr>
+      <p:grpSpPr>
+        <a:xfrm>
+          <a:off x="0" y="0"/>
+          <a:ext cx="0" cy="0"/>
+          <a:chOff x="0" y="0"/>
+          <a:chExt cx="0" cy="0"/>
+        </a:xfrm>
+      </p:grpSpPr>
+      <p:sp>
+        <p:nvSpPr>
+          <p:cNvPr id="2" name="Oval 1">
+            <a:extLst>
+              <a:ext uri="{FF2B5EF4-FFF2-40B4-BE49-F238E27FC236}">
+                <a16:creationId xmlns:a16="http://schemas.microsoft.com/office/drawing/2014/main" id="{EA42FA1F-4366-428E-BCA5-427F25A1BE41}"/>
+              </a:ext>
+            </a:extLst>
+          </p:cNvPr>
+          <p:cNvSpPr/>
+          <p:nvPr/>
+        </p:nvSpPr>
+        <p:spPr>
+          <a:xfrm>
+            <a:off x="4328160" y="467360"/>
+            <a:ext cx="15199360" cy="11380083"/>
+          </a:xfrm>
+          <a:prstGeom prst="ellipse">
+            <a:avLst/>
+          </a:prstGeom>
+          <a:solidFill>
+            <a:srgbClr val="041C32"/>
+          </a:solidFill>
+        </p:spPr>
+        <p:style>
+          <a:lnRef idx="2">
+            <a:schemeClr val="accent1">
+              <a:shade val="50000"/>
+            </a:schemeClr>
+          </a:lnRef>
+          <a:fillRef idx="1">
+            <a:schemeClr val="accent1"/>
+          </a:fillRef>
+          <a:effectRef idx="0">
+            <a:schemeClr val="accent1"/>
+          </a:effectRef>
+          <a:fontRef idx="minor">
+            <a:schemeClr val="lt1"/>
+          </a:fontRef>
+        </p:style>
+        <p:txBody>
+          <a:bodyPr rtlCol="0" anchor="ctr"/>
+          <a:lstStyle/>
+          <a:p>
+            <a:pPr algn="ctr"/>
+            <a:endParaRPr lang="en-US"/>
+          </a:p>
+        </p:txBody>
+      </p:sp>
+      <p:pic>
+        <p:nvPicPr>
+          <p:cNvPr id="4" name="Picture 3">
+            <a:extLst>
+              <a:ext uri="{FF2B5EF4-FFF2-40B4-BE49-F238E27FC236}">
+                <a16:creationId xmlns:a16="http://schemas.microsoft.com/office/drawing/2014/main" id="{B450F231-23AE-4F87-ADAF-27CDF1697F88}"/>
+              </a:ext>
+            </a:extLst>
+          </p:cNvPr>
+          <p:cNvPicPr>
+            <a:picLocks noChangeAspect="1"/>
+          </p:cNvPicPr>
+          <p:nvPr/>
+        </p:nvPicPr>
+        <p:blipFill>
+          <a:blip r:embed="rId2"/>
+          <a:stretch>
+            <a:fillRect/>
+          </a:stretch>
+        </p:blipFill>
+        <p:spPr>
+          <a:xfrm>
+            <a:off x="10938669" y="1668756"/>
+            <a:ext cx="6695627" cy="5806364"/>
+          </a:xfrm>
+          <a:prstGeom prst="rect">
+            <a:avLst/>
+          </a:prstGeom>
+        </p:spPr>
+      </p:pic>
+      <p:pic>
+        <p:nvPicPr>
+          <p:cNvPr id="5" name="Picture 4">
+            <a:extLst>
+              <a:ext uri="{FF2B5EF4-FFF2-40B4-BE49-F238E27FC236}">
+                <a16:creationId xmlns:a16="http://schemas.microsoft.com/office/drawing/2014/main" id="{42DC76B3-C1D3-40B9-AE22-2D6FA67C7E2F}"/>
+              </a:ext>
+            </a:extLst>
+          </p:cNvPr>
+          <p:cNvPicPr>
+            <a:picLocks noChangeAspect="1"/>
+          </p:cNvPicPr>
+          <p:nvPr/>
+        </p:nvPicPr>
+        <p:blipFill>
+          <a:blip r:embed="rId3"/>
+          <a:stretch>
+            <a:fillRect/>
+          </a:stretch>
+        </p:blipFill>
+        <p:spPr>
+          <a:xfrm>
+            <a:off x="6283196" y="2506687"/>
+            <a:ext cx="4130503" cy="4130503"/>
+          </a:xfrm>
+          <a:prstGeom prst="rect">
+            <a:avLst/>
+          </a:prstGeom>
+        </p:spPr>
+      </p:pic>
+      <p:sp>
+        <p:nvSpPr>
+          <p:cNvPr id="7" name="TextBox 6">
+            <a:extLst>
+              <a:ext uri="{FF2B5EF4-FFF2-40B4-BE49-F238E27FC236}">
+                <a16:creationId xmlns:a16="http://schemas.microsoft.com/office/drawing/2014/main" id="{86DBB56B-5BF3-4F21-B2BA-A5EB5D6391A5}"/>
+              </a:ext>
+            </a:extLst>
+          </p:cNvPr>
+          <p:cNvSpPr txBox="1"/>
+          <p:nvPr/>
+        </p:nvSpPr>
+        <p:spPr>
+          <a:xfrm flipH="1">
+            <a:off x="6461759" y="7445093"/>
+            <a:ext cx="10972800" cy="1862048"/>
+          </a:xfrm>
+          <a:prstGeom prst="rect">
+            <a:avLst/>
+          </a:prstGeom>
+          <a:noFill/>
+        </p:spPr>
+        <p:txBody>
+          <a:bodyPr wrap="square" rtlCol="0">
+            <a:spAutoFit/>
+          </a:bodyPr>
+          <a:lstStyle/>
+          <a:p>
+            <a:pPr algn="ctr"/>
+            <a:r>
+              <a:rPr lang="en-US" sz="11500" dirty="0" err="1">
+                <a:solidFill>
+                  <a:srgbClr val="ECB365"/>
+                </a:solidFill>
+                <a:latin typeface="Segoe UI" panose="020B0502040204020203" pitchFamily="34" charset="0"/>
+                <a:cs typeface="Segoe UI" panose="020B0502040204020203" pitchFamily="34" charset="0"/>
+              </a:rPr>
+              <a:t>DeepCTR</a:t>
+            </a:r>
+            <a:endParaRPr lang="en-US" sz="11500" dirty="0">
+              <a:solidFill>
+                <a:srgbClr val="ECB365"/>
+              </a:solidFill>
+              <a:latin typeface="Segoe UI" panose="020B0502040204020203" pitchFamily="34" charset="0"/>
+              <a:cs typeface="Segoe UI" panose="020B0502040204020203" pitchFamily="34" charset="0"/>
+            </a:endParaRPr>
+          </a:p>
+        </p:txBody>
+      </p:sp>
+    </p:spTree>
+    <p:extLst>
+      <p:ext uri="{BB962C8B-B14F-4D97-AF65-F5344CB8AC3E}">
+        <p14:creationId xmlns:p14="http://schemas.microsoft.com/office/powerpoint/2010/main" val="789226209"/>
+      </p:ext>
+    </p:extLst>
+  </p:cSld>
+  <p:clrMapOvr>
+    <a:masterClrMapping/>
+  </p:clrMapOvr>
+</p:sld>
+</file>
+
+<file path=ppt/slides/slide5.xml><?xml version="1.0" encoding="utf-8"?>
+<p:sld xmlns:a="http://schemas.openxmlformats.org/drawingml/2006/main" xmlns:r="http://schemas.openxmlformats.org/officeDocument/2006/relationships" xmlns:p="http://schemas.openxmlformats.org/presentationml/2006/main">
+  <p:cSld>
+    <p:spTree>
+      <p:nvGrpSpPr>
+        <p:cNvPr id="1" name=""/>
+        <p:cNvGrpSpPr/>
+        <p:nvPr/>
+      </p:nvGrpSpPr>
+      <p:grpSpPr>
+        <a:xfrm>
+          <a:off x="0" y="0"/>
+          <a:ext cx="0" cy="0"/>
+          <a:chOff x="0" y="0"/>
+          <a:chExt cx="0" cy="0"/>
+        </a:xfrm>
+      </p:grpSpPr>
+      <p:sp>
+        <p:nvSpPr>
+          <p:cNvPr id="2" name="Oval 1">
+            <a:extLst>
+              <a:ext uri="{FF2B5EF4-FFF2-40B4-BE49-F238E27FC236}">
+                <a16:creationId xmlns:a16="http://schemas.microsoft.com/office/drawing/2014/main" id="{EA42FA1F-4366-428E-BCA5-427F25A1BE41}"/>
+              </a:ext>
+            </a:extLst>
+          </p:cNvPr>
+          <p:cNvSpPr/>
+          <p:nvPr/>
+        </p:nvSpPr>
+        <p:spPr>
+          <a:xfrm>
+            <a:off x="4328160" y="467360"/>
+            <a:ext cx="15199360" cy="11380083"/>
+          </a:xfrm>
+          <a:prstGeom prst="ellipse">
+            <a:avLst/>
+          </a:prstGeom>
+          <a:solidFill>
+            <a:srgbClr val="041C32"/>
+          </a:solidFill>
+        </p:spPr>
+        <p:style>
+          <a:lnRef idx="2">
+            <a:schemeClr val="accent1">
+              <a:shade val="50000"/>
+            </a:schemeClr>
+          </a:lnRef>
+          <a:fillRef idx="1">
+            <a:schemeClr val="accent1"/>
+          </a:fillRef>
+          <a:effectRef idx="0">
+            <a:schemeClr val="accent1"/>
+          </a:effectRef>
+          <a:fontRef idx="minor">
+            <a:schemeClr val="lt1"/>
+          </a:fontRef>
+        </p:style>
+        <p:txBody>
+          <a:bodyPr rtlCol="0" anchor="ctr"/>
+          <a:lstStyle/>
+          <a:p>
+            <a:pPr algn="ctr"/>
+            <a:endParaRPr lang="en-US"/>
+          </a:p>
+        </p:txBody>
+      </p:sp>
+      <p:grpSp>
+        <p:nvGrpSpPr>
+          <p:cNvPr id="3" name="Group 2">
+            <a:extLst>
+              <a:ext uri="{FF2B5EF4-FFF2-40B4-BE49-F238E27FC236}">
+                <a16:creationId xmlns:a16="http://schemas.microsoft.com/office/drawing/2014/main" id="{573126E4-8D53-40CB-B237-59B6329BB0A5}"/>
+              </a:ext>
+            </a:extLst>
+          </p:cNvPr>
+          <p:cNvGrpSpPr/>
+          <p:nvPr/>
+        </p:nvGrpSpPr>
+        <p:grpSpPr>
+          <a:xfrm>
+            <a:off x="6441440" y="2582716"/>
+            <a:ext cx="10972800" cy="7149371"/>
+            <a:chOff x="6441440" y="1665659"/>
+            <a:chExt cx="10972800" cy="7149371"/>
+          </a:xfrm>
+        </p:grpSpPr>
+        <p:pic>
+          <p:nvPicPr>
+            <p:cNvPr id="5" name="Picture 4">
+              <a:extLst>
+                <a:ext uri="{FF2B5EF4-FFF2-40B4-BE49-F238E27FC236}">
+                  <a16:creationId xmlns:a16="http://schemas.microsoft.com/office/drawing/2014/main" id="{42DC76B3-C1D3-40B9-AE22-2D6FA67C7E2F}"/>
+                </a:ext>
+              </a:extLst>
+            </p:cNvPr>
+            <p:cNvPicPr>
+              <a:picLocks noChangeAspect="1"/>
+            </p:cNvPicPr>
+            <p:nvPr/>
+          </p:nvPicPr>
+          <p:blipFill>
+            <a:blip r:embed="rId2"/>
+            <a:stretch>
+              <a:fillRect/>
+            </a:stretch>
+          </p:blipFill>
+          <p:spPr>
+            <a:xfrm>
+              <a:off x="9862589" y="1665659"/>
+              <a:ext cx="4130503" cy="4130503"/>
+            </a:xfrm>
+            <a:prstGeom prst="rect">
+              <a:avLst/>
+            </a:prstGeom>
+          </p:spPr>
+        </p:pic>
+        <p:sp>
+          <p:nvSpPr>
+            <p:cNvPr id="7" name="TextBox 6">
+              <a:extLst>
+                <a:ext uri="{FF2B5EF4-FFF2-40B4-BE49-F238E27FC236}">
+                  <a16:creationId xmlns:a16="http://schemas.microsoft.com/office/drawing/2014/main" id="{86DBB56B-5BF3-4F21-B2BA-A5EB5D6391A5}"/>
+                </a:ext>
+              </a:extLst>
+            </p:cNvPr>
+            <p:cNvSpPr txBox="1"/>
+            <p:nvPr/>
+          </p:nvSpPr>
+          <p:spPr>
+            <a:xfrm flipH="1">
+              <a:off x="6441440" y="6599039"/>
+              <a:ext cx="10972800" cy="2215991"/>
+            </a:xfrm>
+            <a:prstGeom prst="rect">
+              <a:avLst/>
+            </a:prstGeom>
+            <a:noFill/>
+          </p:spPr>
+          <p:txBody>
+            <a:bodyPr wrap="square" rtlCol="0">
+              <a:spAutoFit/>
+            </a:bodyPr>
+            <a:lstStyle/>
+            <a:p>
+              <a:pPr algn="ctr"/>
+              <a:r>
+                <a:rPr lang="en-US" sz="13800" dirty="0" err="1">
+                  <a:solidFill>
+                    <a:schemeClr val="bg1"/>
+                  </a:solidFill>
+                  <a:latin typeface="Avenir LT Std 45 Book" panose="020B0502020203020204" pitchFamily="34" charset="0"/>
+                  <a:cs typeface="Segoe UI" panose="020B0502040204020203" pitchFamily="34" charset="0"/>
+                </a:rPr>
+                <a:t>DeepCTR</a:t>
+              </a:r>
+              <a:endParaRPr lang="en-US" sz="13800" dirty="0">
+                <a:solidFill>
+                  <a:schemeClr val="bg1"/>
+                </a:solidFill>
+                <a:latin typeface="Avenir LT Std 45 Book" panose="020B0502020203020204" pitchFamily="34" charset="0"/>
+                <a:cs typeface="Segoe UI" panose="020B0502040204020203" pitchFamily="34" charset="0"/>
+              </a:endParaRPr>
+            </a:p>
+          </p:txBody>
+        </p:sp>
+      </p:grpSp>
+    </p:spTree>
+    <p:extLst>
+      <p:ext uri="{BB962C8B-B14F-4D97-AF65-F5344CB8AC3E}">
+        <p14:creationId xmlns:p14="http://schemas.microsoft.com/office/powerpoint/2010/main" val="382071106"/>
+      </p:ext>
+    </p:extLst>
+  </p:cSld>
+  <p:clrMapOvr>
+    <a:masterClrMapping/>
+  </p:clrMapOvr>
+</p:sld>
+</file>
+
+<file path=ppt/slides/slide6.xml><?xml version="1.0" encoding="utf-8"?>
+<p:sld xmlns:a="http://schemas.openxmlformats.org/drawingml/2006/main" xmlns:r="http://schemas.openxmlformats.org/officeDocument/2006/relationships" xmlns:p="http://schemas.openxmlformats.org/presentationml/2006/main">
+  <p:cSld>
+    <p:spTree>
+      <p:nvGrpSpPr>
+        <p:cNvPr id="1" name=""/>
+        <p:cNvGrpSpPr/>
+        <p:nvPr/>
+      </p:nvGrpSpPr>
+      <p:grpSpPr>
+        <a:xfrm>
+          <a:off x="0" y="0"/>
+          <a:ext cx="0" cy="0"/>
+          <a:chOff x="0" y="0"/>
+          <a:chExt cx="0" cy="0"/>
+        </a:xfrm>
+      </p:grpSpPr>
+      <p:sp>
+        <p:nvSpPr>
+          <p:cNvPr id="2" name="Oval 1">
+            <a:extLst>
+              <a:ext uri="{FF2B5EF4-FFF2-40B4-BE49-F238E27FC236}">
+                <a16:creationId xmlns:a16="http://schemas.microsoft.com/office/drawing/2014/main" id="{EA42FA1F-4366-428E-BCA5-427F25A1BE41}"/>
+              </a:ext>
+            </a:extLst>
+          </p:cNvPr>
+          <p:cNvSpPr/>
+          <p:nvPr/>
+        </p:nvSpPr>
+        <p:spPr>
+          <a:xfrm>
+            <a:off x="4328160" y="467360"/>
+            <a:ext cx="15199360" cy="11380083"/>
+          </a:xfrm>
+          <a:prstGeom prst="ellipse">
+            <a:avLst/>
+          </a:prstGeom>
+          <a:solidFill>
+            <a:srgbClr val="041C32"/>
+          </a:solidFill>
+        </p:spPr>
+        <p:style>
+          <a:lnRef idx="2">
+            <a:schemeClr val="accent1">
+              <a:shade val="50000"/>
+            </a:schemeClr>
+          </a:lnRef>
+          <a:fillRef idx="1">
+            <a:schemeClr val="accent1"/>
+          </a:fillRef>
+          <a:effectRef idx="0">
+            <a:schemeClr val="accent1"/>
+          </a:effectRef>
+          <a:fontRef idx="minor">
+            <a:schemeClr val="lt1"/>
+          </a:fontRef>
+        </p:style>
+        <p:txBody>
+          <a:bodyPr rtlCol="0" anchor="ctr"/>
+          <a:lstStyle/>
+          <a:p>
+            <a:pPr algn="ctr"/>
+            <a:endParaRPr lang="en-US"/>
+          </a:p>
+        </p:txBody>
+      </p:sp>
+      <p:pic>
+        <p:nvPicPr>
+          <p:cNvPr id="5" name="Picture 4">
+            <a:extLst>
+              <a:ext uri="{FF2B5EF4-FFF2-40B4-BE49-F238E27FC236}">
+                <a16:creationId xmlns:a16="http://schemas.microsoft.com/office/drawing/2014/main" id="{42DC76B3-C1D3-40B9-AE22-2D6FA67C7E2F}"/>
+              </a:ext>
+            </a:extLst>
+          </p:cNvPr>
+          <p:cNvPicPr>
+            <a:picLocks noChangeAspect="1"/>
+          </p:cNvPicPr>
+          <p:nvPr/>
+        </p:nvPicPr>
+        <p:blipFill>
+          <a:blip r:embed="rId2"/>
+          <a:stretch>
+            <a:fillRect/>
+          </a:stretch>
+        </p:blipFill>
+        <p:spPr>
+          <a:xfrm>
+            <a:off x="8954654" y="3122814"/>
+            <a:ext cx="5946371" cy="5946371"/>
+          </a:xfrm>
+          <a:prstGeom prst="rect">
+            <a:avLst/>
+          </a:prstGeom>
+        </p:spPr>
+      </p:pic>
+    </p:spTree>
+    <p:extLst>
+      <p:ext uri="{BB962C8B-B14F-4D97-AF65-F5344CB8AC3E}">
+        <p14:creationId xmlns:p14="http://schemas.microsoft.com/office/powerpoint/2010/main" val="519885833"/>
       </p:ext>
     </p:extLst>
   </p:cSld>

</xml_diff>